<commit_message>
Tuto fixes after Maxime test
</commit_message>
<xml_diff>
--- a/MultiscaleSRModel/tutorial/Tuto Script OSIRIM English.pptx
+++ b/MultiscaleSRModel/tutorial/Tuto Script OSIRIM English.pptx
@@ -264,7 +264,7 @@
           <a:p>
             <a:fld id="{D0D0445F-8041-4B92-924E-95CB86C1E4D8}" type="datetimeFigureOut">
               <a:rPr lang="fr-FR" smtClean="0"/>
-              <a:t>10/03/2021</a:t>
+              <a:t>11/03/2021</a:t>
             </a:fld>
             <a:endParaRPr lang="fr-FR"/>
           </a:p>
@@ -462,7 +462,7 @@
           <a:p>
             <a:fld id="{D0D0445F-8041-4B92-924E-95CB86C1E4D8}" type="datetimeFigureOut">
               <a:rPr lang="fr-FR" smtClean="0"/>
-              <a:t>10/03/2021</a:t>
+              <a:t>11/03/2021</a:t>
             </a:fld>
             <a:endParaRPr lang="fr-FR"/>
           </a:p>
@@ -670,7 +670,7 @@
           <a:p>
             <a:fld id="{D0D0445F-8041-4B92-924E-95CB86C1E4D8}" type="datetimeFigureOut">
               <a:rPr lang="fr-FR" smtClean="0"/>
-              <a:t>10/03/2021</a:t>
+              <a:t>11/03/2021</a:t>
             </a:fld>
             <a:endParaRPr lang="fr-FR"/>
           </a:p>
@@ -868,7 +868,7 @@
           <a:p>
             <a:fld id="{D0D0445F-8041-4B92-924E-95CB86C1E4D8}" type="datetimeFigureOut">
               <a:rPr lang="fr-FR" smtClean="0"/>
-              <a:t>10/03/2021</a:t>
+              <a:t>11/03/2021</a:t>
             </a:fld>
             <a:endParaRPr lang="fr-FR"/>
           </a:p>
@@ -1143,7 +1143,7 @@
           <a:p>
             <a:fld id="{D0D0445F-8041-4B92-924E-95CB86C1E4D8}" type="datetimeFigureOut">
               <a:rPr lang="fr-FR" smtClean="0"/>
-              <a:t>10/03/2021</a:t>
+              <a:t>11/03/2021</a:t>
             </a:fld>
             <a:endParaRPr lang="fr-FR"/>
           </a:p>
@@ -1408,7 +1408,7 @@
           <a:p>
             <a:fld id="{D0D0445F-8041-4B92-924E-95CB86C1E4D8}" type="datetimeFigureOut">
               <a:rPr lang="fr-FR" smtClean="0"/>
-              <a:t>10/03/2021</a:t>
+              <a:t>11/03/2021</a:t>
             </a:fld>
             <a:endParaRPr lang="fr-FR"/>
           </a:p>
@@ -1820,7 +1820,7 @@
           <a:p>
             <a:fld id="{D0D0445F-8041-4B92-924E-95CB86C1E4D8}" type="datetimeFigureOut">
               <a:rPr lang="fr-FR" smtClean="0"/>
-              <a:t>10/03/2021</a:t>
+              <a:t>11/03/2021</a:t>
             </a:fld>
             <a:endParaRPr lang="fr-FR"/>
           </a:p>
@@ -1961,7 +1961,7 @@
           <a:p>
             <a:fld id="{D0D0445F-8041-4B92-924E-95CB86C1E4D8}" type="datetimeFigureOut">
               <a:rPr lang="fr-FR" smtClean="0"/>
-              <a:t>10/03/2021</a:t>
+              <a:t>11/03/2021</a:t>
             </a:fld>
             <a:endParaRPr lang="fr-FR"/>
           </a:p>
@@ -2074,7 +2074,7 @@
           <a:p>
             <a:fld id="{D0D0445F-8041-4B92-924E-95CB86C1E4D8}" type="datetimeFigureOut">
               <a:rPr lang="fr-FR" smtClean="0"/>
-              <a:t>10/03/2021</a:t>
+              <a:t>11/03/2021</a:t>
             </a:fld>
             <a:endParaRPr lang="fr-FR"/>
           </a:p>
@@ -2385,7 +2385,7 @@
           <a:p>
             <a:fld id="{D0D0445F-8041-4B92-924E-95CB86C1E4D8}" type="datetimeFigureOut">
               <a:rPr lang="fr-FR" smtClean="0"/>
-              <a:t>10/03/2021</a:t>
+              <a:t>11/03/2021</a:t>
             </a:fld>
             <a:endParaRPr lang="fr-FR"/>
           </a:p>
@@ -2673,7 +2673,7 @@
           <a:p>
             <a:fld id="{D0D0445F-8041-4B92-924E-95CB86C1E4D8}" type="datetimeFigureOut">
               <a:rPr lang="fr-FR" smtClean="0"/>
-              <a:t>10/03/2021</a:t>
+              <a:t>11/03/2021</a:t>
             </a:fld>
             <a:endParaRPr lang="fr-FR"/>
           </a:p>
@@ -2914,7 +2914,7 @@
           <a:p>
             <a:fld id="{D0D0445F-8041-4B92-924E-95CB86C1E4D8}" type="datetimeFigureOut">
               <a:rPr lang="fr-FR" smtClean="0"/>
-              <a:t>10/03/2021</a:t>
+              <a:t>11/03/2021</a:t>
             </a:fld>
             <a:endParaRPr lang="fr-FR"/>
           </a:p>
@@ -5451,7 +5451,7 @@
                   <a:schemeClr val="accent1"/>
                 </a:solidFill>
               </a:rPr>
-              <a:t>Cluster de calcul to use </a:t>
+              <a:t>Cluster to use </a:t>
             </a:r>
             <a:r>
               <a:rPr lang="fr-FR" dirty="0" err="1">
@@ -7140,15 +7140,6 @@
 </file>
 
 <file path=customXml/item1.xml><?xml version="1.0" encoding="utf-8"?>
-<?mso-contentType ?>
-<FormTemplates xmlns="http://schemas.microsoft.com/sharepoint/v3/contenttype/forms">
-  <Display>DocumentLibraryForm</Display>
-  <Edit>DocumentLibraryForm</Edit>
-  <New>DocumentLibraryForm</New>
-</FormTemplates>
-</file>
-
-<file path=customXml/item2.xml><?xml version="1.0" encoding="utf-8"?>
 <ct:contentTypeSchema xmlns:ct="http://schemas.microsoft.com/office/2006/metadata/contentType" xmlns:ma="http://schemas.microsoft.com/office/2006/metadata/properties/metaAttributes" ct:_="" ma:_="" ma:contentTypeName="Document" ma:contentTypeID="0x01010065136651B65FB44B9E33BE7EF607CEB9" ma:contentTypeVersion="10" ma:contentTypeDescription="Crée un document." ma:contentTypeScope="" ma:versionID="6ae57800f4d2cacb67f448103e9d8587">
   <xsd:schema xmlns:xsd="http://www.w3.org/2001/XMLSchema" xmlns:xs="http://www.w3.org/2001/XMLSchema" xmlns:p="http://schemas.microsoft.com/office/2006/metadata/properties" xmlns:ns3="ed6d2ca2-a9f8-4aea-a5aa-ecbf43ebf678" xmlns:ns4="5693ce9c-904e-416c-a25b-2d5bb414c91c" targetNamespace="http://schemas.microsoft.com/office/2006/metadata/properties" ma:root="true" ma:fieldsID="69216c491bdcaf0a7c0a2ff3a94ba038" ns3:_="" ns4:_="">
     <xsd:import namespace="ed6d2ca2-a9f8-4aea-a5aa-ecbf43ebf678"/>
@@ -7351,6 +7342,15 @@
 </ct:contentTypeSchema>
 </file>
 
+<file path=customXml/item2.xml><?xml version="1.0" encoding="utf-8"?>
+<?mso-contentType ?>
+<FormTemplates xmlns="http://schemas.microsoft.com/sharepoint/v3/contenttype/forms">
+  <Display>DocumentLibraryForm</Display>
+  <Edit>DocumentLibraryForm</Edit>
+  <New>DocumentLibraryForm</New>
+</FormTemplates>
+</file>
+
 <file path=customXml/item3.xml><?xml version="1.0" encoding="utf-8"?>
 <p:properties xmlns:p="http://schemas.microsoft.com/office/2006/metadata/properties" xmlns:xsi="http://www.w3.org/2001/XMLSchema-instance" xmlns:pc="http://schemas.microsoft.com/office/infopath/2007/PartnerControls">
   <documentManagement/>
@@ -7358,14 +7358,6 @@
 </file>
 
 <file path=customXml/itemProps1.xml><?xml version="1.0" encoding="utf-8"?>
-<ds:datastoreItem xmlns:ds="http://schemas.openxmlformats.org/officeDocument/2006/customXml" ds:itemID="{73345432-02F4-4424-B188-D9E84FC42F64}">
-  <ds:schemaRefs>
-    <ds:schemaRef ds:uri="http://schemas.microsoft.com/sharepoint/v3/contenttype/forms"/>
-  </ds:schemaRefs>
-</ds:datastoreItem>
-</file>
-
-<file path=customXml/itemProps2.xml><?xml version="1.0" encoding="utf-8"?>
 <ds:datastoreItem xmlns:ds="http://schemas.openxmlformats.org/officeDocument/2006/customXml" ds:itemID="{9FB40D22-8B86-48D6-BD0C-3CD93F141AB0}">
   <ds:schemaRefs>
     <ds:schemaRef ds:uri="http://schemas.microsoft.com/office/2006/metadata/contentType"/>
@@ -7380,6 +7372,14 @@
     <ds:schemaRef ds:uri="http://purl.org/dc/elements/1.1/"/>
     <ds:schemaRef ds:uri="http://purl.org/dc/terms/"/>
     <ds:schemaRef ds:uri="http://schemas.microsoft.com/internal/obd"/>
+  </ds:schemaRefs>
+</ds:datastoreItem>
+</file>
+
+<file path=customXml/itemProps2.xml><?xml version="1.0" encoding="utf-8"?>
+<ds:datastoreItem xmlns:ds="http://schemas.openxmlformats.org/officeDocument/2006/customXml" ds:itemID="{73345432-02F4-4424-B188-D9E84FC42F64}">
+  <ds:schemaRefs>
+    <ds:schemaRef ds:uri="http://schemas.microsoft.com/sharepoint/v3/contenttype/forms"/>
   </ds:schemaRefs>
 </ds:datastoreItem>
 </file>

</xml_diff>